<commit_message>
update NACA ALE CASE1 output Pressure Coeff; add NACA EBM CASE1
</commit_message>
<xml_diff>
--- a/AERO-Tutorial.pptx
+++ b/AERO-Tutorial.pptx
@@ -6,6 +6,7 @@
   </p:sldMasterIdLst>
   <p:sldIdLst>
     <p:sldId id="256" r:id="rId2"/>
+    <p:sldId id="257" r:id="rId3"/>
   </p:sldIdLst>
   <p:sldSz cx="12192000" cy="6858000"/>
   <p:notesSz cx="6858000" cy="9144000"/>
@@ -4244,6 +4245,175 @@
 </p:sld>
 </file>
 
+<file path=ppt/slides/slide2.xml><?xml version="1.0" encoding="utf-8"?>
+<p:sld xmlns:a="http://schemas.openxmlformats.org/drawingml/2006/main" xmlns:r="http://schemas.openxmlformats.org/officeDocument/2006/relationships" xmlns:p="http://schemas.openxmlformats.org/presentationml/2006/main">
+  <p:cSld>
+    <p:spTree>
+      <p:nvGrpSpPr>
+        <p:cNvPr id="1" name=""/>
+        <p:cNvGrpSpPr/>
+        <p:nvPr/>
+      </p:nvGrpSpPr>
+      <p:grpSpPr>
+        <a:xfrm>
+          <a:off x="0" y="0"/>
+          <a:ext cx="0" cy="0"/>
+          <a:chOff x="0" y="0"/>
+          <a:chExt cx="0" cy="0"/>
+        </a:xfrm>
+      </p:grpSpPr>
+      <p:grpSp>
+        <p:nvGrpSpPr>
+          <p:cNvPr id="12" name="Group 11">
+            <a:extLst>
+              <a:ext uri="{FF2B5EF4-FFF2-40B4-BE49-F238E27FC236}">
+                <a16:creationId xmlns:a16="http://schemas.microsoft.com/office/drawing/2014/main" id="{5CB094B3-2120-1C10-0CFA-2E20527DD15F}"/>
+              </a:ext>
+            </a:extLst>
+          </p:cNvPr>
+          <p:cNvGrpSpPr/>
+          <p:nvPr/>
+        </p:nvGrpSpPr>
+        <p:grpSpPr>
+          <a:xfrm>
+            <a:off x="524107" y="318406"/>
+            <a:ext cx="11403330" cy="5485755"/>
+            <a:chOff x="524107" y="318406"/>
+            <a:chExt cx="11403330" cy="5485755"/>
+          </a:xfrm>
+        </p:grpSpPr>
+        <p:pic>
+          <p:nvPicPr>
+            <p:cNvPr id="9" name="Picture 8">
+              <a:extLst>
+                <a:ext uri="{FF2B5EF4-FFF2-40B4-BE49-F238E27FC236}">
+                  <a16:creationId xmlns:a16="http://schemas.microsoft.com/office/drawing/2014/main" id="{5F782FED-ED01-2471-2808-7041F5F9A193}"/>
+                </a:ext>
+              </a:extLst>
+            </p:cNvPr>
+            <p:cNvPicPr>
+              <a:picLocks noChangeAspect="1"/>
+            </p:cNvPicPr>
+            <p:nvPr/>
+          </p:nvPicPr>
+          <p:blipFill rotWithShape="1">
+            <a:blip r:embed="rId2"/>
+            <a:srcRect l="7460" t="4399" r="8098" b="5180"/>
+            <a:stretch/>
+          </p:blipFill>
+          <p:spPr>
+            <a:xfrm>
+              <a:off x="6437220" y="318406"/>
+              <a:ext cx="5490217" cy="5485755"/>
+            </a:xfrm>
+            <a:prstGeom prst="rect">
+              <a:avLst/>
+            </a:prstGeom>
+          </p:spPr>
+        </p:pic>
+        <p:pic>
+          <p:nvPicPr>
+            <p:cNvPr id="5" name="Picture 4">
+              <a:extLst>
+                <a:ext uri="{FF2B5EF4-FFF2-40B4-BE49-F238E27FC236}">
+                  <a16:creationId xmlns:a16="http://schemas.microsoft.com/office/drawing/2014/main" id="{6D96B33F-E2BD-B9CF-8C0F-7807DEA53BF4}"/>
+                </a:ext>
+              </a:extLst>
+            </p:cNvPr>
+            <p:cNvPicPr>
+              <a:picLocks noChangeAspect="1"/>
+            </p:cNvPicPr>
+            <p:nvPr/>
+          </p:nvPicPr>
+          <p:blipFill rotWithShape="1">
+            <a:blip r:embed="rId3"/>
+            <a:srcRect l="6642" t="3816" r="6463" b="3473"/>
+            <a:stretch/>
+          </p:blipFill>
+          <p:spPr>
+            <a:xfrm>
+              <a:off x="524107" y="318406"/>
+              <a:ext cx="5472879" cy="5485755"/>
+            </a:xfrm>
+            <a:prstGeom prst="rect">
+              <a:avLst/>
+            </a:prstGeom>
+          </p:spPr>
+        </p:pic>
+        <p:pic>
+          <p:nvPicPr>
+            <p:cNvPr id="7" name="Picture 6">
+              <a:extLst>
+                <a:ext uri="{FF2B5EF4-FFF2-40B4-BE49-F238E27FC236}">
+                  <a16:creationId xmlns:a16="http://schemas.microsoft.com/office/drawing/2014/main" id="{9D528BE6-2A72-F917-7936-C3A5242C2F4D}"/>
+                </a:ext>
+              </a:extLst>
+            </p:cNvPr>
+            <p:cNvPicPr>
+              <a:picLocks noChangeAspect="1"/>
+            </p:cNvPicPr>
+            <p:nvPr/>
+          </p:nvPicPr>
+          <p:blipFill>
+            <a:blip r:embed="rId4"/>
+            <a:stretch>
+              <a:fillRect/>
+            </a:stretch>
+          </p:blipFill>
+          <p:spPr>
+            <a:xfrm>
+              <a:off x="805632" y="3524462"/>
+              <a:ext cx="5018049" cy="2224772"/>
+            </a:xfrm>
+            <a:prstGeom prst="rect">
+              <a:avLst/>
+            </a:prstGeom>
+          </p:spPr>
+        </p:pic>
+        <p:pic>
+          <p:nvPicPr>
+            <p:cNvPr id="11" name="Picture 10">
+              <a:extLst>
+                <a:ext uri="{FF2B5EF4-FFF2-40B4-BE49-F238E27FC236}">
+                  <a16:creationId xmlns:a16="http://schemas.microsoft.com/office/drawing/2014/main" id="{F51421CD-64A3-2F26-EF69-70EFC380F9A4}"/>
+                </a:ext>
+              </a:extLst>
+            </p:cNvPr>
+            <p:cNvPicPr>
+              <a:picLocks noChangeAspect="1"/>
+            </p:cNvPicPr>
+            <p:nvPr/>
+          </p:nvPicPr>
+          <p:blipFill>
+            <a:blip r:embed="rId5"/>
+            <a:stretch>
+              <a:fillRect/>
+            </a:stretch>
+          </p:blipFill>
+          <p:spPr>
+            <a:xfrm>
+              <a:off x="8665795" y="3634315"/>
+              <a:ext cx="3002098" cy="2114919"/>
+            </a:xfrm>
+            <a:prstGeom prst="rect">
+              <a:avLst/>
+            </a:prstGeom>
+          </p:spPr>
+        </p:pic>
+      </p:grpSp>
+    </p:spTree>
+    <p:extLst>
+      <p:ext uri="{BB962C8B-B14F-4D97-AF65-F5344CB8AC3E}">
+        <p14:creationId xmlns:p14="http://schemas.microsoft.com/office/powerpoint/2010/main" val="1252687603"/>
+      </p:ext>
+    </p:extLst>
+  </p:cSld>
+  <p:clrMapOvr>
+    <a:masterClrMapping/>
+  </p:clrMapOvr>
+</p:sld>
+</file>
+
 <file path=ppt/theme/theme1.xml><?xml version="1.0" encoding="utf-8"?>
 <a:theme xmlns:a="http://schemas.openxmlformats.org/drawingml/2006/main" name="Office Theme">
   <a:themeElements>

</xml_diff>

<commit_message>
update NACA ALE to turbulence flow
</commit_message>
<xml_diff>
--- a/AERO-Tutorial.pptx
+++ b/AERO-Tutorial.pptx
@@ -7,6 +7,7 @@
   <p:sldIdLst>
     <p:sldId id="256" r:id="rId2"/>
     <p:sldId id="257" r:id="rId3"/>
+    <p:sldId id="258" r:id="rId4"/>
   </p:sldIdLst>
   <p:sldSz cx="12192000" cy="6858000"/>
   <p:notesSz cx="6858000" cy="9144000"/>
@@ -262,7 +263,7 @@
           <a:p>
             <a:fld id="{90B080BA-25E8-814B-A423-46F52382F9B1}" type="datetimeFigureOut">
               <a:rPr lang="en-CN" smtClean="0"/>
-              <a:t>2023/12/21</a:t>
+              <a:t>2023/12/24</a:t>
             </a:fld>
             <a:endParaRPr lang="en-CN"/>
           </a:p>
@@ -462,7 +463,7 @@
           <a:p>
             <a:fld id="{90B080BA-25E8-814B-A423-46F52382F9B1}" type="datetimeFigureOut">
               <a:rPr lang="en-CN" smtClean="0"/>
-              <a:t>2023/12/21</a:t>
+              <a:t>2023/12/24</a:t>
             </a:fld>
             <a:endParaRPr lang="en-CN"/>
           </a:p>
@@ -672,7 +673,7 @@
           <a:p>
             <a:fld id="{90B080BA-25E8-814B-A423-46F52382F9B1}" type="datetimeFigureOut">
               <a:rPr lang="en-CN" smtClean="0"/>
-              <a:t>2023/12/21</a:t>
+              <a:t>2023/12/24</a:t>
             </a:fld>
             <a:endParaRPr lang="en-CN"/>
           </a:p>
@@ -872,7 +873,7 @@
           <a:p>
             <a:fld id="{90B080BA-25E8-814B-A423-46F52382F9B1}" type="datetimeFigureOut">
               <a:rPr lang="en-CN" smtClean="0"/>
-              <a:t>2023/12/21</a:t>
+              <a:t>2023/12/24</a:t>
             </a:fld>
             <a:endParaRPr lang="en-CN"/>
           </a:p>
@@ -1148,7 +1149,7 @@
           <a:p>
             <a:fld id="{90B080BA-25E8-814B-A423-46F52382F9B1}" type="datetimeFigureOut">
               <a:rPr lang="en-CN" smtClean="0"/>
-              <a:t>2023/12/21</a:t>
+              <a:t>2023/12/24</a:t>
             </a:fld>
             <a:endParaRPr lang="en-CN"/>
           </a:p>
@@ -1416,7 +1417,7 @@
           <a:p>
             <a:fld id="{90B080BA-25E8-814B-A423-46F52382F9B1}" type="datetimeFigureOut">
               <a:rPr lang="en-CN" smtClean="0"/>
-              <a:t>2023/12/21</a:t>
+              <a:t>2023/12/24</a:t>
             </a:fld>
             <a:endParaRPr lang="en-CN"/>
           </a:p>
@@ -1831,7 +1832,7 @@
           <a:p>
             <a:fld id="{90B080BA-25E8-814B-A423-46F52382F9B1}" type="datetimeFigureOut">
               <a:rPr lang="en-CN" smtClean="0"/>
-              <a:t>2023/12/21</a:t>
+              <a:t>2023/12/24</a:t>
             </a:fld>
             <a:endParaRPr lang="en-CN"/>
           </a:p>
@@ -1973,7 +1974,7 @@
           <a:p>
             <a:fld id="{90B080BA-25E8-814B-A423-46F52382F9B1}" type="datetimeFigureOut">
               <a:rPr lang="en-CN" smtClean="0"/>
-              <a:t>2023/12/21</a:t>
+              <a:t>2023/12/24</a:t>
             </a:fld>
             <a:endParaRPr lang="en-CN"/>
           </a:p>
@@ -2086,7 +2087,7 @@
           <a:p>
             <a:fld id="{90B080BA-25E8-814B-A423-46F52382F9B1}" type="datetimeFigureOut">
               <a:rPr lang="en-CN" smtClean="0"/>
-              <a:t>2023/12/21</a:t>
+              <a:t>2023/12/24</a:t>
             </a:fld>
             <a:endParaRPr lang="en-CN"/>
           </a:p>
@@ -2399,7 +2400,7 @@
           <a:p>
             <a:fld id="{90B080BA-25E8-814B-A423-46F52382F9B1}" type="datetimeFigureOut">
               <a:rPr lang="en-CN" smtClean="0"/>
-              <a:t>2023/12/21</a:t>
+              <a:t>2023/12/24</a:t>
             </a:fld>
             <a:endParaRPr lang="en-CN"/>
           </a:p>
@@ -2688,7 +2689,7 @@
           <a:p>
             <a:fld id="{90B080BA-25E8-814B-A423-46F52382F9B1}" type="datetimeFigureOut">
               <a:rPr lang="en-CN" smtClean="0"/>
-              <a:t>2023/12/21</a:t>
+              <a:t>2023/12/24</a:t>
             </a:fld>
             <a:endParaRPr lang="en-CN"/>
           </a:p>
@@ -2931,7 +2932,7 @@
           <a:p>
             <a:fld id="{90B080BA-25E8-814B-A423-46F52382F9B1}" type="datetimeFigureOut">
               <a:rPr lang="en-CN" smtClean="0"/>
-              <a:t>2023/12/21</a:t>
+              <a:t>2023/12/24</a:t>
             </a:fld>
             <a:endParaRPr lang="en-CN"/>
           </a:p>
@@ -4414,6 +4415,95 @@
 </p:sld>
 </file>
 
+<file path=ppt/slides/slide3.xml><?xml version="1.0" encoding="utf-8"?>
+<p:sld xmlns:a="http://schemas.openxmlformats.org/drawingml/2006/main" xmlns:r="http://schemas.openxmlformats.org/officeDocument/2006/relationships" xmlns:p="http://schemas.openxmlformats.org/presentationml/2006/main">
+  <p:cSld>
+    <p:spTree>
+      <p:nvGrpSpPr>
+        <p:cNvPr id="1" name=""/>
+        <p:cNvGrpSpPr/>
+        <p:nvPr/>
+      </p:nvGrpSpPr>
+      <p:grpSpPr>
+        <a:xfrm>
+          <a:off x="0" y="0"/>
+          <a:ext cx="0" cy="0"/>
+          <a:chOff x="0" y="0"/>
+          <a:chExt cx="0" cy="0"/>
+        </a:xfrm>
+      </p:grpSpPr>
+      <p:pic>
+        <p:nvPicPr>
+          <p:cNvPr id="5" name="Picture 4">
+            <a:extLst>
+              <a:ext uri="{FF2B5EF4-FFF2-40B4-BE49-F238E27FC236}">
+                <a16:creationId xmlns:a16="http://schemas.microsoft.com/office/drawing/2014/main" id="{0DBAF74B-3AF4-D1DE-6E3D-4E7E19B9D2A7}"/>
+              </a:ext>
+            </a:extLst>
+          </p:cNvPr>
+          <p:cNvPicPr>
+            <a:picLocks noChangeAspect="1"/>
+          </p:cNvPicPr>
+          <p:nvPr/>
+        </p:nvPicPr>
+        <p:blipFill>
+          <a:blip r:embed="rId2"/>
+          <a:stretch>
+            <a:fillRect/>
+          </a:stretch>
+        </p:blipFill>
+        <p:spPr>
+          <a:xfrm>
+            <a:off x="337112" y="0"/>
+            <a:ext cx="7772400" cy="4627900"/>
+          </a:xfrm>
+          <a:prstGeom prst="rect">
+            <a:avLst/>
+          </a:prstGeom>
+        </p:spPr>
+      </p:pic>
+      <p:pic>
+        <p:nvPicPr>
+          <p:cNvPr id="7" name="Picture 6">
+            <a:extLst>
+              <a:ext uri="{FF2B5EF4-FFF2-40B4-BE49-F238E27FC236}">
+                <a16:creationId xmlns:a16="http://schemas.microsoft.com/office/drawing/2014/main" id="{3DEA45E0-F7D0-24EC-5573-214FE6CC9836}"/>
+              </a:ext>
+            </a:extLst>
+          </p:cNvPr>
+          <p:cNvPicPr>
+            <a:picLocks noChangeAspect="1"/>
+          </p:cNvPicPr>
+          <p:nvPr/>
+        </p:nvPicPr>
+        <p:blipFill rotWithShape="1">
+          <a:blip r:embed="rId3"/>
+          <a:srcRect l="13897" r="13722"/>
+          <a:stretch/>
+        </p:blipFill>
+        <p:spPr>
+          <a:xfrm>
+            <a:off x="7947211" y="0"/>
+            <a:ext cx="5257801" cy="4631824"/>
+          </a:xfrm>
+          <a:prstGeom prst="rect">
+            <a:avLst/>
+          </a:prstGeom>
+        </p:spPr>
+      </p:pic>
+    </p:spTree>
+    <p:extLst>
+      <p:ext uri="{BB962C8B-B14F-4D97-AF65-F5344CB8AC3E}">
+        <p14:creationId xmlns:p14="http://schemas.microsoft.com/office/powerpoint/2010/main" val="1607009375"/>
+      </p:ext>
+    </p:extLst>
+  </p:cSld>
+  <p:clrMapOvr>
+    <a:masterClrMapping/>
+  </p:clrMapOvr>
+</p:sld>
+</file>
+
 <file path=ppt/theme/theme1.xml><?xml version="1.0" encoding="utf-8"?>
 <a:theme xmlns:a="http://schemas.openxmlformats.org/drawingml/2006/main" name="Office Theme">
   <a:themeElements>

</xml_diff>